<commit_message>
Finished BEC_DFG chapter and sent to Ian
</commit_message>
<xml_diff>
--- a/BEC_DFG figures/RbUpgradesPictures.pptx
+++ b/BEC_DFG figures/RbUpgradesPictures.pptx
@@ -11,6 +11,10 @@
     <p:sldId id="259" r:id="rId5"/>
     <p:sldId id="260" r:id="rId6"/>
     <p:sldId id="261" r:id="rId7"/>
+    <p:sldId id="264" r:id="rId8"/>
+    <p:sldId id="265" r:id="rId9"/>
+    <p:sldId id="262" r:id="rId10"/>
+    <p:sldId id="263" r:id="rId11"/>
   </p:sldIdLst>
   <p:sldSz cx="12192000" cy="6858000"/>
   <p:notesSz cx="6858000" cy="9144000"/>
@@ -248,7 +252,7 @@
           <a:p>
             <a:fld id="{AB97D4D2-66C3-418C-BDA4-D79E1CD7FD75}" type="datetimeFigureOut">
               <a:rPr lang="en-US" smtClean="0"/>
-              <a:t>1/3/2019</a:t>
+              <a:t>1/4/2019</a:t>
             </a:fld>
             <a:endParaRPr lang="en-US"/>
           </a:p>
@@ -418,7 +422,7 @@
           <a:p>
             <a:fld id="{AB97D4D2-66C3-418C-BDA4-D79E1CD7FD75}" type="datetimeFigureOut">
               <a:rPr lang="en-US" smtClean="0"/>
-              <a:t>1/3/2019</a:t>
+              <a:t>1/4/2019</a:t>
             </a:fld>
             <a:endParaRPr lang="en-US"/>
           </a:p>
@@ -598,7 +602,7 @@
           <a:p>
             <a:fld id="{AB97D4D2-66C3-418C-BDA4-D79E1CD7FD75}" type="datetimeFigureOut">
               <a:rPr lang="en-US" smtClean="0"/>
-              <a:t>1/3/2019</a:t>
+              <a:t>1/4/2019</a:t>
             </a:fld>
             <a:endParaRPr lang="en-US"/>
           </a:p>
@@ -768,7 +772,7 @@
           <a:p>
             <a:fld id="{AB97D4D2-66C3-418C-BDA4-D79E1CD7FD75}" type="datetimeFigureOut">
               <a:rPr lang="en-US" smtClean="0"/>
-              <a:t>1/3/2019</a:t>
+              <a:t>1/4/2019</a:t>
             </a:fld>
             <a:endParaRPr lang="en-US"/>
           </a:p>
@@ -1014,7 +1018,7 @@
           <a:p>
             <a:fld id="{AB97D4D2-66C3-418C-BDA4-D79E1CD7FD75}" type="datetimeFigureOut">
               <a:rPr lang="en-US" smtClean="0"/>
-              <a:t>1/3/2019</a:t>
+              <a:t>1/4/2019</a:t>
             </a:fld>
             <a:endParaRPr lang="en-US"/>
           </a:p>
@@ -1246,7 +1250,7 @@
           <a:p>
             <a:fld id="{AB97D4D2-66C3-418C-BDA4-D79E1CD7FD75}" type="datetimeFigureOut">
               <a:rPr lang="en-US" smtClean="0"/>
-              <a:t>1/3/2019</a:t>
+              <a:t>1/4/2019</a:t>
             </a:fld>
             <a:endParaRPr lang="en-US"/>
           </a:p>
@@ -1613,7 +1617,7 @@
           <a:p>
             <a:fld id="{AB97D4D2-66C3-418C-BDA4-D79E1CD7FD75}" type="datetimeFigureOut">
               <a:rPr lang="en-US" smtClean="0"/>
-              <a:t>1/3/2019</a:t>
+              <a:t>1/4/2019</a:t>
             </a:fld>
             <a:endParaRPr lang="en-US"/>
           </a:p>
@@ -1731,7 +1735,7 @@
           <a:p>
             <a:fld id="{AB97D4D2-66C3-418C-BDA4-D79E1CD7FD75}" type="datetimeFigureOut">
               <a:rPr lang="en-US" smtClean="0"/>
-              <a:t>1/3/2019</a:t>
+              <a:t>1/4/2019</a:t>
             </a:fld>
             <a:endParaRPr lang="en-US"/>
           </a:p>
@@ -1826,7 +1830,7 @@
           <a:p>
             <a:fld id="{AB97D4D2-66C3-418C-BDA4-D79E1CD7FD75}" type="datetimeFigureOut">
               <a:rPr lang="en-US" smtClean="0"/>
-              <a:t>1/3/2019</a:t>
+              <a:t>1/4/2019</a:t>
             </a:fld>
             <a:endParaRPr lang="en-US"/>
           </a:p>
@@ -2103,7 +2107,7 @@
           <a:p>
             <a:fld id="{AB97D4D2-66C3-418C-BDA4-D79E1CD7FD75}" type="datetimeFigureOut">
               <a:rPr lang="en-US" smtClean="0"/>
-              <a:t>1/3/2019</a:t>
+              <a:t>1/4/2019</a:t>
             </a:fld>
             <a:endParaRPr lang="en-US"/>
           </a:p>
@@ -2356,7 +2360,7 @@
           <a:p>
             <a:fld id="{AB97D4D2-66C3-418C-BDA4-D79E1CD7FD75}" type="datetimeFigureOut">
               <a:rPr lang="en-US" smtClean="0"/>
-              <a:t>1/3/2019</a:t>
+              <a:t>1/4/2019</a:t>
             </a:fld>
             <a:endParaRPr lang="en-US"/>
           </a:p>
@@ -2569,7 +2573,7 @@
           <a:p>
             <a:fld id="{AB97D4D2-66C3-418C-BDA4-D79E1CD7FD75}" type="datetimeFigureOut">
               <a:rPr lang="en-US" smtClean="0"/>
-              <a:t>1/3/2019</a:t>
+              <a:t>1/4/2019</a:t>
             </a:fld>
             <a:endParaRPr lang="en-US"/>
           </a:p>
@@ -3984,6 +3988,77 @@
 </p:sld>
 </file>
 
+<file path=ppt/slides/slide10.xml><?xml version="1.0" encoding="utf-8"?>
+<p:sld xmlns:a="http://schemas.openxmlformats.org/drawingml/2006/main" xmlns:r="http://schemas.openxmlformats.org/officeDocument/2006/relationships" xmlns:p="http://schemas.openxmlformats.org/presentationml/2006/main">
+  <p:cSld>
+    <p:spTree>
+      <p:nvGrpSpPr>
+        <p:cNvPr id="1" name=""/>
+        <p:cNvGrpSpPr/>
+        <p:nvPr/>
+      </p:nvGrpSpPr>
+      <p:grpSpPr>
+        <a:xfrm>
+          <a:off x="0" y="0"/>
+          <a:ext cx="0" cy="0"/>
+          <a:chOff x="0" y="0"/>
+          <a:chExt cx="0" cy="0"/>
+        </a:xfrm>
+      </p:grpSpPr>
+      <p:pic>
+        <p:nvPicPr>
+          <p:cNvPr id="2050" name="Picture 2" descr="https://lh5.googleusercontent.com/eN7yhfS2AOzMujJ9-Cmz6IOFUH5_drVFJzPLQEsBsdpeEdlKlvc2z8KmKAWUWydipfrenh-kQ528XPDiL1oEMJ6c5-bSUDE8RJ36IemTtdZyyJ7ykiUafX3daxlyzhyS0f3VzeWW"/>
+          <p:cNvPicPr>
+            <a:picLocks noChangeAspect="1" noChangeArrowheads="1"/>
+          </p:cNvPicPr>
+          <p:nvPr/>
+        </p:nvPicPr>
+        <p:blipFill>
+          <a:blip r:embed="rId2">
+            <a:extLst>
+              <a:ext uri="{28A0092B-C50C-407E-A947-70E740481C1C}">
+                <a14:useLocalDpi xmlns:a14="http://schemas.microsoft.com/office/drawing/2010/main" val="0"/>
+              </a:ext>
+            </a:extLst>
+          </a:blip>
+          <a:srcRect/>
+          <a:stretch>
+            <a:fillRect/>
+          </a:stretch>
+        </p:blipFill>
+        <p:spPr bwMode="auto">
+          <a:xfrm>
+            <a:off x="2459062" y="1551598"/>
+            <a:ext cx="5486400" cy="3789485"/>
+          </a:xfrm>
+          <a:prstGeom prst="rect">
+            <a:avLst/>
+          </a:prstGeom>
+          <a:noFill/>
+          <a:extLst>
+            <a:ext uri="{909E8E84-426E-40DD-AFC4-6F175D3DCCD1}">
+              <a14:hiddenFill xmlns:a14="http://schemas.microsoft.com/office/drawing/2010/main">
+                <a:solidFill>
+                  <a:srgbClr val="FFFFFF"/>
+                </a:solidFill>
+              </a14:hiddenFill>
+            </a:ext>
+          </a:extLst>
+        </p:spPr>
+      </p:pic>
+    </p:spTree>
+    <p:extLst>
+      <p:ext uri="{BB962C8B-B14F-4D97-AF65-F5344CB8AC3E}">
+        <p14:creationId xmlns:p14="http://schemas.microsoft.com/office/powerpoint/2010/main" val="357508401"/>
+      </p:ext>
+    </p:extLst>
+  </p:cSld>
+  <p:clrMapOvr>
+    <a:masterClrMapping/>
+  </p:clrMapOvr>
+</p:sld>
+</file>
+
 <file path=ppt/slides/slide2.xml><?xml version="1.0" encoding="utf-8"?>
 <p:sld xmlns:a="http://schemas.openxmlformats.org/drawingml/2006/main" xmlns:r="http://schemas.openxmlformats.org/officeDocument/2006/relationships" xmlns:p="http://schemas.openxmlformats.org/presentationml/2006/main">
   <p:cSld>
@@ -5280,6 +5355,550 @@
 </p:sld>
 </file>
 
+<file path=ppt/slides/slide7.xml><?xml version="1.0" encoding="utf-8"?>
+<p:sld xmlns:a="http://schemas.openxmlformats.org/drawingml/2006/main" xmlns:r="http://schemas.openxmlformats.org/officeDocument/2006/relationships" xmlns:p="http://schemas.openxmlformats.org/presentationml/2006/main">
+  <p:cSld>
+    <p:spTree>
+      <p:nvGrpSpPr>
+        <p:cNvPr id="1" name=""/>
+        <p:cNvGrpSpPr/>
+        <p:nvPr/>
+      </p:nvGrpSpPr>
+      <p:grpSpPr>
+        <a:xfrm>
+          <a:off x="0" y="0"/>
+          <a:ext cx="0" cy="0"/>
+          <a:chOff x="0" y="0"/>
+          <a:chExt cx="0" cy="0"/>
+        </a:xfrm>
+      </p:grpSpPr>
+      <p:grpSp>
+        <p:nvGrpSpPr>
+          <p:cNvPr id="9" name="Group 8"/>
+          <p:cNvGrpSpPr/>
+          <p:nvPr/>
+        </p:nvGrpSpPr>
+        <p:grpSpPr>
+          <a:xfrm>
+            <a:off x="2918541" y="595424"/>
+            <a:ext cx="5029200" cy="3781425"/>
+            <a:chOff x="2918541" y="595424"/>
+            <a:chExt cx="5029200" cy="3781425"/>
+          </a:xfrm>
+        </p:grpSpPr>
+        <p:pic>
+          <p:nvPicPr>
+            <p:cNvPr id="2050" name="Picture 2" descr="BEC &#10;L, : 83mm &#10;La: 500mm &#10;dichroic filter &#10;9.5cm &#10;19.4cm &#10;15.4 cm &#10;Raman D &#10;Raman &#10;SLM &#10;7 cm &#10;up-going probe "/>
+            <p:cNvPicPr>
+              <a:picLocks noChangeAspect="1" noChangeArrowheads="1"/>
+            </p:cNvPicPr>
+            <p:nvPr/>
+          </p:nvPicPr>
+          <p:blipFill>
+            <a:blip r:embed="rId2">
+              <a:extLst>
+                <a:ext uri="{28A0092B-C50C-407E-A947-70E740481C1C}">
+                  <a14:useLocalDpi xmlns:a14="http://schemas.microsoft.com/office/drawing/2010/main" val="0"/>
+                </a:ext>
+              </a:extLst>
+            </a:blip>
+            <a:srcRect/>
+            <a:stretch>
+              <a:fillRect/>
+            </a:stretch>
+          </p:blipFill>
+          <p:spPr bwMode="auto">
+            <a:xfrm>
+              <a:off x="2918541" y="595424"/>
+              <a:ext cx="5029200" cy="3781425"/>
+            </a:xfrm>
+            <a:prstGeom prst="rect">
+              <a:avLst/>
+            </a:prstGeom>
+            <a:noFill/>
+            <a:extLst>
+              <a:ext uri="{909E8E84-426E-40DD-AFC4-6F175D3DCCD1}">
+                <a14:hiddenFill xmlns:a14="http://schemas.microsoft.com/office/drawing/2010/main">
+                  <a:solidFill>
+                    <a:srgbClr val="FFFFFF"/>
+                  </a:solidFill>
+                </a14:hiddenFill>
+              </a:ext>
+            </a:extLst>
+          </p:spPr>
+        </p:pic>
+        <p:grpSp>
+          <p:nvGrpSpPr>
+            <p:cNvPr id="8" name="Group 7"/>
+            <p:cNvGrpSpPr/>
+            <p:nvPr/>
+          </p:nvGrpSpPr>
+          <p:grpSpPr>
+            <a:xfrm>
+              <a:off x="6504086" y="2923759"/>
+              <a:ext cx="1426257" cy="849746"/>
+              <a:chOff x="6504086" y="2923759"/>
+              <a:chExt cx="1426257" cy="849746"/>
+            </a:xfrm>
+          </p:grpSpPr>
+          <p:cxnSp>
+            <p:nvCxnSpPr>
+              <p:cNvPr id="5" name="Straight Connector 4"/>
+              <p:cNvCxnSpPr/>
+              <p:nvPr/>
+            </p:nvCxnSpPr>
+            <p:spPr>
+              <a:xfrm rot="5400000">
+                <a:off x="6851559" y="3271746"/>
+                <a:ext cx="0" cy="694946"/>
+              </a:xfrm>
+              <a:prstGeom prst="line">
+                <a:avLst/>
+              </a:prstGeom>
+              <a:ln w="28575">
+                <a:solidFill>
+                  <a:srgbClr val="F14A50"/>
+                </a:solidFill>
+                <a:prstDash val="dash"/>
+              </a:ln>
+            </p:spPr>
+            <p:style>
+              <a:lnRef idx="1">
+                <a:schemeClr val="accent1"/>
+              </a:lnRef>
+              <a:fillRef idx="0">
+                <a:schemeClr val="accent1"/>
+              </a:fillRef>
+              <a:effectRef idx="0">
+                <a:schemeClr val="accent1"/>
+              </a:effectRef>
+              <a:fontRef idx="minor">
+                <a:schemeClr val="tx1"/>
+              </a:fontRef>
+            </p:style>
+          </p:cxnSp>
+          <p:cxnSp>
+            <p:nvCxnSpPr>
+              <p:cNvPr id="3" name="Straight Connector 2"/>
+              <p:cNvCxnSpPr/>
+              <p:nvPr/>
+            </p:nvCxnSpPr>
+            <p:spPr>
+              <a:xfrm flipH="1">
+                <a:off x="7070501" y="3425775"/>
+                <a:ext cx="309093" cy="334851"/>
+              </a:xfrm>
+              <a:prstGeom prst="line">
+                <a:avLst/>
+              </a:prstGeom>
+              <a:ln w="38100">
+                <a:solidFill>
+                  <a:schemeClr val="accent6"/>
+                </a:solidFill>
+              </a:ln>
+            </p:spPr>
+            <p:style>
+              <a:lnRef idx="1">
+                <a:schemeClr val="accent1"/>
+              </a:lnRef>
+              <a:fillRef idx="0">
+                <a:schemeClr val="accent1"/>
+              </a:fillRef>
+              <a:effectRef idx="0">
+                <a:schemeClr val="accent1"/>
+              </a:effectRef>
+              <a:fontRef idx="minor">
+                <a:schemeClr val="tx1"/>
+              </a:fontRef>
+            </p:style>
+          </p:cxnSp>
+          <p:sp>
+            <p:nvSpPr>
+              <p:cNvPr id="6" name="Oval 5"/>
+              <p:cNvSpPr/>
+              <p:nvPr/>
+            </p:nvSpPr>
+            <p:spPr>
+              <a:xfrm>
+                <a:off x="7199289" y="3632098"/>
+                <a:ext cx="45719" cy="141407"/>
+              </a:xfrm>
+              <a:prstGeom prst="ellipse">
+                <a:avLst/>
+              </a:prstGeom>
+              <a:solidFill>
+                <a:schemeClr val="bg1"/>
+              </a:solidFill>
+              <a:ln>
+                <a:solidFill>
+                  <a:schemeClr val="bg1"/>
+                </a:solidFill>
+              </a:ln>
+            </p:spPr>
+            <p:style>
+              <a:lnRef idx="2">
+                <a:schemeClr val="accent1">
+                  <a:shade val="50000"/>
+                </a:schemeClr>
+              </a:lnRef>
+              <a:fillRef idx="1">
+                <a:schemeClr val="accent1"/>
+              </a:fillRef>
+              <a:effectRef idx="0">
+                <a:schemeClr val="accent1"/>
+              </a:effectRef>
+              <a:fontRef idx="minor">
+                <a:schemeClr val="lt1"/>
+              </a:fontRef>
+            </p:style>
+            <p:txBody>
+              <a:bodyPr rtlCol="0" anchor="ctr"/>
+              <a:lstStyle/>
+              <a:p>
+                <a:pPr algn="ctr"/>
+                <a:endParaRPr lang="en-US"/>
+              </a:p>
+            </p:txBody>
+          </p:sp>
+          <p:sp>
+            <p:nvSpPr>
+              <p:cNvPr id="7" name="TextBox 6"/>
+              <p:cNvSpPr txBox="1"/>
+              <p:nvPr/>
+            </p:nvSpPr>
+            <p:spPr>
+              <a:xfrm>
+                <a:off x="7175008" y="2923759"/>
+                <a:ext cx="755335" cy="553998"/>
+              </a:xfrm>
+              <a:prstGeom prst="rect">
+                <a:avLst/>
+              </a:prstGeom>
+              <a:noFill/>
+            </p:spPr>
+            <p:txBody>
+              <a:bodyPr wrap="none" rtlCol="0">
+                <a:spAutoFit/>
+              </a:bodyPr>
+              <a:lstStyle/>
+              <a:p>
+                <a:r>
+                  <a:rPr lang="en-US" sz="1000" dirty="0" smtClean="0">
+                    <a:latin typeface="Cambria" panose="02040503050406030204" pitchFamily="18" charset="0"/>
+                    <a:cs typeface="Arial" panose="020B0604020202020204" pitchFamily="34" charset="0"/>
+                  </a:rPr>
+                  <a:t>kinematic </a:t>
+                </a:r>
+              </a:p>
+              <a:p>
+                <a:r>
+                  <a:rPr lang="en-US" sz="1000" dirty="0" smtClean="0">
+                    <a:latin typeface="Cambria" panose="02040503050406030204" pitchFamily="18" charset="0"/>
+                    <a:cs typeface="Arial" panose="020B0604020202020204" pitchFamily="34" charset="0"/>
+                  </a:rPr>
+                  <a:t>base</a:t>
+                </a:r>
+              </a:p>
+              <a:p>
+                <a:r>
+                  <a:rPr lang="en-US" sz="1000" dirty="0" smtClean="0">
+                    <a:latin typeface="Cambria" panose="02040503050406030204" pitchFamily="18" charset="0"/>
+                    <a:cs typeface="Arial" panose="020B0604020202020204" pitchFamily="34" charset="0"/>
+                  </a:rPr>
+                  <a:t>mirror</a:t>
+                </a:r>
+                <a:endParaRPr lang="en-US" sz="1000" dirty="0">
+                  <a:latin typeface="Cambria" panose="02040503050406030204" pitchFamily="18" charset="0"/>
+                  <a:cs typeface="Arial" panose="020B0604020202020204" pitchFamily="34" charset="0"/>
+                </a:endParaRPr>
+              </a:p>
+            </p:txBody>
+          </p:sp>
+        </p:grpSp>
+      </p:grpSp>
+    </p:spTree>
+    <p:extLst>
+      <p:ext uri="{BB962C8B-B14F-4D97-AF65-F5344CB8AC3E}">
+        <p14:creationId xmlns:p14="http://schemas.microsoft.com/office/powerpoint/2010/main" val="300603640"/>
+      </p:ext>
+    </p:extLst>
+  </p:cSld>
+  <p:clrMapOvr>
+    <a:masterClrMapping/>
+  </p:clrMapOvr>
+</p:sld>
+</file>
+
+<file path=ppt/slides/slide8.xml><?xml version="1.0" encoding="utf-8"?>
+<p:sld xmlns:a="http://schemas.openxmlformats.org/drawingml/2006/main" xmlns:r="http://schemas.openxmlformats.org/officeDocument/2006/relationships" xmlns:p="http://schemas.openxmlformats.org/presentationml/2006/main">
+  <p:cSld>
+    <p:spTree>
+      <p:nvGrpSpPr>
+        <p:cNvPr id="1" name=""/>
+        <p:cNvGrpSpPr/>
+        <p:nvPr/>
+      </p:nvGrpSpPr>
+      <p:grpSpPr>
+        <a:xfrm>
+          <a:off x="0" y="0"/>
+          <a:ext cx="0" cy="0"/>
+          <a:chOff x="0" y="0"/>
+          <a:chExt cx="0" cy="0"/>
+        </a:xfrm>
+      </p:grpSpPr>
+      <p:pic>
+        <p:nvPicPr>
+          <p:cNvPr id="3074" name="Picture 2" descr="Machine generated alternative text:&#10;Thoriabs AL2550 &#10;f=50mm, D=25mm &#10;3.85mm &#10;0.35&quot; &#10;—4.21 cm from atom &#10;to top of PCB &#10;BEC "/>
+          <p:cNvPicPr>
+            <a:picLocks noChangeAspect="1" noChangeArrowheads="1"/>
+          </p:cNvPicPr>
+          <p:nvPr/>
+        </p:nvPicPr>
+        <p:blipFill>
+          <a:blip r:embed="rId2">
+            <a:extLst>
+              <a:ext uri="{28A0092B-C50C-407E-A947-70E740481C1C}">
+                <a14:useLocalDpi xmlns:a14="http://schemas.microsoft.com/office/drawing/2010/main" val="0"/>
+              </a:ext>
+            </a:extLst>
+          </a:blip>
+          <a:srcRect/>
+          <a:stretch>
+            <a:fillRect/>
+          </a:stretch>
+        </p:blipFill>
+        <p:spPr bwMode="auto">
+          <a:xfrm>
+            <a:off x="1798078" y="1494687"/>
+            <a:ext cx="4210050" cy="2266951"/>
+          </a:xfrm>
+          <a:prstGeom prst="rect">
+            <a:avLst/>
+          </a:prstGeom>
+          <a:noFill/>
+          <a:extLst>
+            <a:ext uri="{909E8E84-426E-40DD-AFC4-6F175D3DCCD1}">
+              <a14:hiddenFill xmlns:a14="http://schemas.microsoft.com/office/drawing/2010/main">
+                <a:solidFill>
+                  <a:srgbClr val="FFFFFF"/>
+                </a:solidFill>
+              </a14:hiddenFill>
+            </a:ext>
+          </a:extLst>
+        </p:spPr>
+      </p:pic>
+    </p:spTree>
+    <p:extLst>
+      <p:ext uri="{BB962C8B-B14F-4D97-AF65-F5344CB8AC3E}">
+        <p14:creationId xmlns:p14="http://schemas.microsoft.com/office/powerpoint/2010/main" val="1103561477"/>
+      </p:ext>
+    </p:extLst>
+  </p:cSld>
+  <p:clrMapOvr>
+    <a:masterClrMapping/>
+  </p:clrMapOvr>
+</p:sld>
+</file>
+
+<file path=ppt/slides/slide9.xml><?xml version="1.0" encoding="utf-8"?>
+<p:sld xmlns:a="http://schemas.openxmlformats.org/drawingml/2006/main" xmlns:r="http://schemas.openxmlformats.org/officeDocument/2006/relationships" xmlns:p="http://schemas.openxmlformats.org/presentationml/2006/main">
+  <p:cSld>
+    <p:spTree>
+      <p:nvGrpSpPr>
+        <p:cNvPr id="1" name=""/>
+        <p:cNvGrpSpPr/>
+        <p:nvPr/>
+      </p:nvGrpSpPr>
+      <p:grpSpPr>
+        <a:xfrm>
+          <a:off x="0" y="0"/>
+          <a:ext cx="0" cy="0"/>
+          <a:chOff x="0" y="0"/>
+          <a:chExt cx="0" cy="0"/>
+        </a:xfrm>
+      </p:grpSpPr>
+      <p:grpSp>
+        <p:nvGrpSpPr>
+          <p:cNvPr id="2" name="Group 1"/>
+          <p:cNvGrpSpPr/>
+          <p:nvPr/>
+        </p:nvGrpSpPr>
+        <p:grpSpPr>
+          <a:xfrm>
+            <a:off x="1307568" y="-310530"/>
+            <a:ext cx="5589167" cy="7333537"/>
+            <a:chOff x="1307568" y="-310530"/>
+            <a:chExt cx="5589167" cy="7333537"/>
+          </a:xfrm>
+        </p:grpSpPr>
+        <p:pic>
+          <p:nvPicPr>
+            <p:cNvPr id="1026" name="Picture 2" descr="https://lh4.googleusercontent.com/LyoVyog5TAiy0nwpdBnmfpJuBdcyz9C4pI0qZZ206IvoMZMGOCeECjQMXTkBoWW4HRoKfu5T5XWT1Ak60vF8X3hVGLu_XB7sGlSdlWhNuLNVgxo17-eYDUQ8SFcQNTEpZRXsVZPo"/>
+            <p:cNvPicPr>
+              <a:picLocks noChangeAspect="1" noChangeArrowheads="1"/>
+            </p:cNvPicPr>
+            <p:nvPr/>
+          </p:nvPicPr>
+          <p:blipFill>
+            <a:blip r:embed="rId2">
+              <a:extLst>
+                <a:ext uri="{28A0092B-C50C-407E-A947-70E740481C1C}">
+                  <a14:useLocalDpi xmlns:a14="http://schemas.microsoft.com/office/drawing/2010/main" val="0"/>
+                </a:ext>
+              </a:extLst>
+            </a:blip>
+            <a:srcRect/>
+            <a:stretch>
+              <a:fillRect/>
+            </a:stretch>
+          </p:blipFill>
+          <p:spPr bwMode="auto">
+            <a:xfrm>
+              <a:off x="1410335" y="-220770"/>
+              <a:ext cx="5486400" cy="4199722"/>
+            </a:xfrm>
+            <a:prstGeom prst="rect">
+              <a:avLst/>
+            </a:prstGeom>
+            <a:noFill/>
+            <a:extLst>
+              <a:ext uri="{909E8E84-426E-40DD-AFC4-6F175D3DCCD1}">
+                <a14:hiddenFill xmlns:a14="http://schemas.microsoft.com/office/drawing/2010/main">
+                  <a:solidFill>
+                    <a:srgbClr val="FFFFFF"/>
+                  </a:solidFill>
+                </a14:hiddenFill>
+              </a:ext>
+            </a:extLst>
+          </p:spPr>
+        </p:pic>
+        <p:pic>
+          <p:nvPicPr>
+            <p:cNvPr id="1028" name="Picture 4" descr="https://lh4.googleusercontent.com/b69V7eJdepobx9uR4Xtq8sadflVjGpRRFOd9-mW1z4kziY_h920PR3t_yABDsw-RdrfkPE32B28xwjeAu0wy8NMCmh73RDCc00_A8hy1Yuo85XOYENKbOX8fFSKmwQfetjEtBF7_"/>
+            <p:cNvPicPr>
+              <a:picLocks noChangeAspect="1" noChangeArrowheads="1"/>
+            </p:cNvPicPr>
+            <p:nvPr/>
+          </p:nvPicPr>
+          <p:blipFill>
+            <a:blip r:embed="rId3">
+              <a:extLst>
+                <a:ext uri="{28A0092B-C50C-407E-A947-70E740481C1C}">
+                  <a14:useLocalDpi xmlns:a14="http://schemas.microsoft.com/office/drawing/2010/main" val="0"/>
+                </a:ext>
+              </a:extLst>
+            </a:blip>
+            <a:srcRect/>
+            <a:stretch>
+              <a:fillRect/>
+            </a:stretch>
+          </p:blipFill>
+          <p:spPr bwMode="auto">
+            <a:xfrm>
+              <a:off x="1410335" y="3978952"/>
+              <a:ext cx="5486400" cy="3044055"/>
+            </a:xfrm>
+            <a:prstGeom prst="rect">
+              <a:avLst/>
+            </a:prstGeom>
+            <a:noFill/>
+            <a:extLst>
+              <a:ext uri="{909E8E84-426E-40DD-AFC4-6F175D3DCCD1}">
+                <a14:hiddenFill xmlns:a14="http://schemas.microsoft.com/office/drawing/2010/main">
+                  <a:solidFill>
+                    <a:srgbClr val="FFFFFF"/>
+                  </a:solidFill>
+                </a14:hiddenFill>
+              </a:ext>
+            </a:extLst>
+          </p:spPr>
+        </p:pic>
+        <p:sp>
+          <p:nvSpPr>
+            <p:cNvPr id="4" name="TextBox 3"/>
+            <p:cNvSpPr txBox="1"/>
+            <p:nvPr/>
+          </p:nvSpPr>
+          <p:spPr>
+            <a:xfrm>
+              <a:off x="1307568" y="-310530"/>
+              <a:ext cx="372218" cy="276999"/>
+            </a:xfrm>
+            <a:prstGeom prst="rect">
+              <a:avLst/>
+            </a:prstGeom>
+            <a:noFill/>
+          </p:spPr>
+          <p:txBody>
+            <a:bodyPr wrap="none" rtlCol="0">
+              <a:spAutoFit/>
+            </a:bodyPr>
+            <a:lstStyle/>
+            <a:p>
+              <a:r>
+                <a:rPr lang="en-US" sz="1200" dirty="0" smtClean="0">
+                  <a:latin typeface="Arial" panose="020B0604020202020204" pitchFamily="34" charset="0"/>
+                  <a:cs typeface="Arial" panose="020B0604020202020204" pitchFamily="34" charset="0"/>
+                </a:rPr>
+                <a:t>(a)</a:t>
+              </a:r>
+              <a:endParaRPr lang="en-US" sz="1200" dirty="0">
+                <a:latin typeface="Arial" panose="020B0604020202020204" pitchFamily="34" charset="0"/>
+                <a:cs typeface="Arial" panose="020B0604020202020204" pitchFamily="34" charset="0"/>
+              </a:endParaRPr>
+            </a:p>
+          </p:txBody>
+        </p:sp>
+        <p:sp>
+          <p:nvSpPr>
+            <p:cNvPr id="5" name="TextBox 4"/>
+            <p:cNvSpPr txBox="1"/>
+            <p:nvPr/>
+          </p:nvSpPr>
+          <p:spPr>
+            <a:xfrm>
+              <a:off x="1307568" y="3872395"/>
+              <a:ext cx="372218" cy="276999"/>
+            </a:xfrm>
+            <a:prstGeom prst="rect">
+              <a:avLst/>
+            </a:prstGeom>
+            <a:noFill/>
+          </p:spPr>
+          <p:txBody>
+            <a:bodyPr wrap="none" rtlCol="0">
+              <a:spAutoFit/>
+            </a:bodyPr>
+            <a:lstStyle/>
+            <a:p>
+              <a:r>
+                <a:rPr lang="en-US" sz="1200" dirty="0" smtClean="0">
+                  <a:latin typeface="Arial" panose="020B0604020202020204" pitchFamily="34" charset="0"/>
+                  <a:cs typeface="Arial" panose="020B0604020202020204" pitchFamily="34" charset="0"/>
+                </a:rPr>
+                <a:t>(b)</a:t>
+              </a:r>
+              <a:endParaRPr lang="en-US" sz="1200" dirty="0">
+                <a:latin typeface="Arial" panose="020B0604020202020204" pitchFamily="34" charset="0"/>
+                <a:cs typeface="Arial" panose="020B0604020202020204" pitchFamily="34" charset="0"/>
+              </a:endParaRPr>
+            </a:p>
+          </p:txBody>
+        </p:sp>
+      </p:grpSp>
+    </p:spTree>
+    <p:extLst>
+      <p:ext uri="{BB962C8B-B14F-4D97-AF65-F5344CB8AC3E}">
+        <p14:creationId xmlns:p14="http://schemas.microsoft.com/office/powerpoint/2010/main" val="2436579048"/>
+      </p:ext>
+    </p:extLst>
+  </p:cSld>
+  <p:clrMapOvr>
+    <a:masterClrMapping/>
+  </p:clrMapOvr>
+</p:sld>
+</file>
+
 <file path=ppt/theme/theme1.xml><?xml version="1.0" encoding="utf-8"?>
 <a:theme xmlns:a="http://schemas.openxmlformats.org/drawingml/2006/main" name="Office Theme">
   <a:themeElements>

</xml_diff>

<commit_message>
Finished draft of last chapter. Edited most of BEC_DFG chapter
</commit_message>
<xml_diff>
--- a/BEC_DFG figures/RbUpgradesPictures.pptx
+++ b/BEC_DFG figures/RbUpgradesPictures.pptx
@@ -252,7 +252,7 @@
           <a:p>
             <a:fld id="{AB97D4D2-66C3-418C-BDA4-D79E1CD7FD75}" type="datetimeFigureOut">
               <a:rPr lang="en-US" smtClean="0"/>
-              <a:t>1/4/2019</a:t>
+              <a:t>1/22/2019</a:t>
             </a:fld>
             <a:endParaRPr lang="en-US"/>
           </a:p>
@@ -422,7 +422,7 @@
           <a:p>
             <a:fld id="{AB97D4D2-66C3-418C-BDA4-D79E1CD7FD75}" type="datetimeFigureOut">
               <a:rPr lang="en-US" smtClean="0"/>
-              <a:t>1/4/2019</a:t>
+              <a:t>1/22/2019</a:t>
             </a:fld>
             <a:endParaRPr lang="en-US"/>
           </a:p>
@@ -602,7 +602,7 @@
           <a:p>
             <a:fld id="{AB97D4D2-66C3-418C-BDA4-D79E1CD7FD75}" type="datetimeFigureOut">
               <a:rPr lang="en-US" smtClean="0"/>
-              <a:t>1/4/2019</a:t>
+              <a:t>1/22/2019</a:t>
             </a:fld>
             <a:endParaRPr lang="en-US"/>
           </a:p>
@@ -772,7 +772,7 @@
           <a:p>
             <a:fld id="{AB97D4D2-66C3-418C-BDA4-D79E1CD7FD75}" type="datetimeFigureOut">
               <a:rPr lang="en-US" smtClean="0"/>
-              <a:t>1/4/2019</a:t>
+              <a:t>1/22/2019</a:t>
             </a:fld>
             <a:endParaRPr lang="en-US"/>
           </a:p>
@@ -1018,7 +1018,7 @@
           <a:p>
             <a:fld id="{AB97D4D2-66C3-418C-BDA4-D79E1CD7FD75}" type="datetimeFigureOut">
               <a:rPr lang="en-US" smtClean="0"/>
-              <a:t>1/4/2019</a:t>
+              <a:t>1/22/2019</a:t>
             </a:fld>
             <a:endParaRPr lang="en-US"/>
           </a:p>
@@ -1250,7 +1250,7 @@
           <a:p>
             <a:fld id="{AB97D4D2-66C3-418C-BDA4-D79E1CD7FD75}" type="datetimeFigureOut">
               <a:rPr lang="en-US" smtClean="0"/>
-              <a:t>1/4/2019</a:t>
+              <a:t>1/22/2019</a:t>
             </a:fld>
             <a:endParaRPr lang="en-US"/>
           </a:p>
@@ -1617,7 +1617,7 @@
           <a:p>
             <a:fld id="{AB97D4D2-66C3-418C-BDA4-D79E1CD7FD75}" type="datetimeFigureOut">
               <a:rPr lang="en-US" smtClean="0"/>
-              <a:t>1/4/2019</a:t>
+              <a:t>1/22/2019</a:t>
             </a:fld>
             <a:endParaRPr lang="en-US"/>
           </a:p>
@@ -1735,7 +1735,7 @@
           <a:p>
             <a:fld id="{AB97D4D2-66C3-418C-BDA4-D79E1CD7FD75}" type="datetimeFigureOut">
               <a:rPr lang="en-US" smtClean="0"/>
-              <a:t>1/4/2019</a:t>
+              <a:t>1/22/2019</a:t>
             </a:fld>
             <a:endParaRPr lang="en-US"/>
           </a:p>
@@ -1830,7 +1830,7 @@
           <a:p>
             <a:fld id="{AB97D4D2-66C3-418C-BDA4-D79E1CD7FD75}" type="datetimeFigureOut">
               <a:rPr lang="en-US" smtClean="0"/>
-              <a:t>1/4/2019</a:t>
+              <a:t>1/22/2019</a:t>
             </a:fld>
             <a:endParaRPr lang="en-US"/>
           </a:p>
@@ -2107,7 +2107,7 @@
           <a:p>
             <a:fld id="{AB97D4D2-66C3-418C-BDA4-D79E1CD7FD75}" type="datetimeFigureOut">
               <a:rPr lang="en-US" smtClean="0"/>
-              <a:t>1/4/2019</a:t>
+              <a:t>1/22/2019</a:t>
             </a:fld>
             <a:endParaRPr lang="en-US"/>
           </a:p>
@@ -2360,7 +2360,7 @@
           <a:p>
             <a:fld id="{AB97D4D2-66C3-418C-BDA4-D79E1CD7FD75}" type="datetimeFigureOut">
               <a:rPr lang="en-US" smtClean="0"/>
-              <a:t>1/4/2019</a:t>
+              <a:t>1/22/2019</a:t>
             </a:fld>
             <a:endParaRPr lang="en-US"/>
           </a:p>
@@ -2573,7 +2573,7 @@
           <a:p>
             <a:fld id="{AB97D4D2-66C3-418C-BDA4-D79E1CD7FD75}" type="datetimeFigureOut">
               <a:rPr lang="en-US" smtClean="0"/>
-              <a:t>1/4/2019</a:t>
+              <a:t>1/22/2019</a:t>
             </a:fld>
             <a:endParaRPr lang="en-US"/>
           </a:p>
@@ -5719,18 +5719,66 @@
       </p:grpSpPr>
       <p:grpSp>
         <p:nvGrpSpPr>
-          <p:cNvPr id="2" name="Group 1"/>
+          <p:cNvPr id="6" name="Group 5"/>
           <p:cNvGrpSpPr/>
           <p:nvPr/>
         </p:nvGrpSpPr>
         <p:grpSpPr>
           <a:xfrm>
-            <a:off x="1307568" y="-310530"/>
-            <a:ext cx="5589167" cy="7333537"/>
-            <a:chOff x="1307568" y="-310530"/>
-            <a:chExt cx="5589167" cy="7333537"/>
+            <a:off x="1307568" y="0"/>
+            <a:ext cx="5286415" cy="6858000"/>
+            <a:chOff x="1307568" y="0"/>
+            <a:chExt cx="5286415" cy="6858000"/>
           </a:xfrm>
         </p:grpSpPr>
+        <p:sp>
+          <p:nvSpPr>
+            <p:cNvPr id="3" name="Rectangle 2"/>
+            <p:cNvSpPr/>
+            <p:nvPr/>
+          </p:nvSpPr>
+          <p:spPr>
+            <a:xfrm>
+              <a:off x="1307568" y="0"/>
+              <a:ext cx="5286415" cy="6858000"/>
+            </a:xfrm>
+            <a:prstGeom prst="rect">
+              <a:avLst/>
+            </a:prstGeom>
+            <a:solidFill>
+              <a:schemeClr val="bg1"/>
+            </a:solidFill>
+            <a:ln>
+              <a:solidFill>
+                <a:schemeClr val="bg1"/>
+              </a:solidFill>
+            </a:ln>
+          </p:spPr>
+          <p:style>
+            <a:lnRef idx="2">
+              <a:schemeClr val="accent1">
+                <a:shade val="50000"/>
+              </a:schemeClr>
+            </a:lnRef>
+            <a:fillRef idx="1">
+              <a:schemeClr val="accent1"/>
+            </a:fillRef>
+            <a:effectRef idx="0">
+              <a:schemeClr val="accent1"/>
+            </a:effectRef>
+            <a:fontRef idx="minor">
+              <a:schemeClr val="lt1"/>
+            </a:fontRef>
+          </p:style>
+          <p:txBody>
+            <a:bodyPr rtlCol="0" anchor="ctr"/>
+            <a:lstStyle/>
+            <a:p>
+              <a:pPr algn="ctr"/>
+              <a:endParaRPr lang="en-US"/>
+            </a:p>
+          </p:txBody>
+        </p:sp>
         <p:pic>
           <p:nvPicPr>
             <p:cNvPr id="1026" name="Picture 2" descr="https://lh4.googleusercontent.com/LyoVyog5TAiy0nwpdBnmfpJuBdcyz9C4pI0qZZ206IvoMZMGOCeECjQMXTkBoWW4HRoKfu5T5XWT1Ak60vF8X3hVGLu_XB7sGlSdlWhNuLNVgxo17-eYDUQ8SFcQNTEpZRXsVZPo"/>
@@ -5754,8 +5802,8 @@
           </p:blipFill>
           <p:spPr bwMode="auto">
             <a:xfrm>
-              <a:off x="1410335" y="-220770"/>
-              <a:ext cx="5486400" cy="4199722"/>
+              <a:off x="1410335" y="139839"/>
+              <a:ext cx="5029200" cy="3849745"/>
             </a:xfrm>
             <a:prstGeom prst="rect">
               <a:avLst/>
@@ -5795,8 +5843,8 @@
           </p:blipFill>
           <p:spPr bwMode="auto">
             <a:xfrm>
-              <a:off x="1410335" y="3978952"/>
-              <a:ext cx="5486400" cy="3044055"/>
+              <a:off x="1410335" y="4004710"/>
+              <a:ext cx="5029200" cy="2790384"/>
             </a:xfrm>
             <a:prstGeom prst="rect">
               <a:avLst/>
@@ -5821,7 +5869,7 @@
           </p:nvSpPr>
           <p:spPr>
             <a:xfrm>
-              <a:off x="1307568" y="-310530"/>
+              <a:off x="1307568" y="62959"/>
               <a:ext cx="372218" cy="276999"/>
             </a:xfrm>
             <a:prstGeom prst="rect">
@@ -5857,7 +5905,7 @@
           </p:nvSpPr>
           <p:spPr>
             <a:xfrm>
-              <a:off x="1307568" y="3872395"/>
+              <a:off x="1307568" y="3898153"/>
               <a:ext cx="372218" cy="276999"/>
             </a:xfrm>
             <a:prstGeom prst="rect">

</xml_diff>